<commit_message>
Risk graf.pptx go risk.png opdatering jf. ekstra risikoer.
</commit_message>
<xml_diff>
--- a/Dokumenter/SEMP/Risk graf.pptx
+++ b/Dokumenter/SEMP/Risk graf.pptx
@@ -110,6 +110,199 @@
 </p:presentation>
 </file>
 
+<file path=ppt/charts/chart1.xml><?xml version="1.0" encoding="utf-8"?>
+<c:chartSpace xmlns:c="http://schemas.openxmlformats.org/drawingml/2006/chart" xmlns:a="http://schemas.openxmlformats.org/drawingml/2006/main" xmlns:r="http://schemas.openxmlformats.org/officeDocument/2006/relationships">
+  <c:date1904 val="0"/>
+  <c:lang val="da-DK"/>
+  <c:roundedCorners val="0"/>
+  <mc:AlternateContent xmlns:mc="http://schemas.openxmlformats.org/markup-compatibility/2006">
+    <mc:Choice xmlns:c14="http://schemas.microsoft.com/office/drawing/2007/8/2/chart" Requires="c14">
+      <c14:style val="132"/>
+    </mc:Choice>
+    <mc:Fallback>
+      <c:style val="32"/>
+    </mc:Fallback>
+  </mc:AlternateContent>
+  <c:chart>
+    <c:title>
+      <c:tx>
+        <c:rich>
+          <a:bodyPr/>
+          <a:lstStyle/>
+          <a:p>
+            <a:pPr>
+              <a:defRPr/>
+            </a:pPr>
+            <a:r>
+              <a:rPr lang="en-US"/>
+              <a:t>Likelihood, Consequence</a:t>
+            </a:r>
+          </a:p>
+        </c:rich>
+      </c:tx>
+      <c:layout/>
+      <c:overlay val="0"/>
+    </c:title>
+    <c:autoTitleDeleted val="0"/>
+    <c:plotArea>
+      <c:layout>
+        <c:manualLayout>
+          <c:layoutTarget val="inner"/>
+          <c:xMode val="edge"/>
+          <c:yMode val="edge"/>
+          <c:x val="3.5630641934192471E-2"/>
+          <c:y val="8.4391133800582621E-2"/>
+          <c:w val="0.92788749355601885"/>
+          <c:h val="0.86972671685270109"/>
+        </c:manualLayout>
+      </c:layout>
+      <c:scatterChart>
+        <c:scatterStyle val="lineMarker"/>
+        <c:varyColors val="0"/>
+        <c:ser>
+          <c:idx val="0"/>
+          <c:order val="0"/>
+          <c:tx>
+            <c:strRef>
+              <c:f>'Ark1'!$D$1</c:f>
+              <c:strCache>
+                <c:ptCount val="1"/>
+                <c:pt idx="0">
+                  <c:v>C</c:v>
+                </c:pt>
+              </c:strCache>
+            </c:strRef>
+          </c:tx>
+          <c:spPr>
+            <a:ln w="66675">
+              <a:noFill/>
+            </a:ln>
+          </c:spPr>
+          <c:marker>
+            <c:symbol val="diamond"/>
+            <c:size val="30"/>
+          </c:marker>
+          <c:xVal>
+            <c:numRef>
+              <c:f>'Ark1'!$C$2:$C$9</c:f>
+              <c:numCache>
+                <c:formatCode>General</c:formatCode>
+                <c:ptCount val="8"/>
+                <c:pt idx="0">
+                  <c:v>6</c:v>
+                </c:pt>
+                <c:pt idx="1">
+                  <c:v>3</c:v>
+                </c:pt>
+                <c:pt idx="2">
+                  <c:v>4</c:v>
+                </c:pt>
+                <c:pt idx="3">
+                  <c:v>3</c:v>
+                </c:pt>
+                <c:pt idx="4">
+                  <c:v>3</c:v>
+                </c:pt>
+                <c:pt idx="5">
+                  <c:v>2</c:v>
+                </c:pt>
+                <c:pt idx="6">
+                  <c:v>1</c:v>
+                </c:pt>
+                <c:pt idx="7">
+                  <c:v>8</c:v>
+                </c:pt>
+              </c:numCache>
+            </c:numRef>
+          </c:xVal>
+          <c:yVal>
+            <c:numRef>
+              <c:f>'Ark1'!$D$2:$D$9</c:f>
+              <c:numCache>
+                <c:formatCode>General</c:formatCode>
+                <c:ptCount val="8"/>
+                <c:pt idx="0">
+                  <c:v>5</c:v>
+                </c:pt>
+                <c:pt idx="1">
+                  <c:v>8</c:v>
+                </c:pt>
+                <c:pt idx="2">
+                  <c:v>6</c:v>
+                </c:pt>
+                <c:pt idx="3">
+                  <c:v>8</c:v>
+                </c:pt>
+                <c:pt idx="4">
+                  <c:v>6</c:v>
+                </c:pt>
+                <c:pt idx="5">
+                  <c:v>9</c:v>
+                </c:pt>
+                <c:pt idx="6">
+                  <c:v>10</c:v>
+                </c:pt>
+                <c:pt idx="7">
+                  <c:v>10</c:v>
+                </c:pt>
+              </c:numCache>
+            </c:numRef>
+          </c:yVal>
+          <c:smooth val="0"/>
+        </c:ser>
+        <c:dLbls>
+          <c:showLegendKey val="0"/>
+          <c:showVal val="0"/>
+          <c:showCatName val="0"/>
+          <c:showSerName val="0"/>
+          <c:showPercent val="0"/>
+          <c:showBubbleSize val="0"/>
+        </c:dLbls>
+        <c:axId val="98362880"/>
+        <c:axId val="98364416"/>
+      </c:scatterChart>
+      <c:valAx>
+        <c:axId val="98362880"/>
+        <c:scaling>
+          <c:orientation val="minMax"/>
+        </c:scaling>
+        <c:delete val="0"/>
+        <c:axPos val="b"/>
+        <c:numFmt formatCode="General" sourceLinked="1"/>
+        <c:majorTickMark val="out"/>
+        <c:minorTickMark val="none"/>
+        <c:tickLblPos val="nextTo"/>
+        <c:crossAx val="98364416"/>
+        <c:crosses val="autoZero"/>
+        <c:crossBetween val="midCat"/>
+      </c:valAx>
+      <c:valAx>
+        <c:axId val="98364416"/>
+        <c:scaling>
+          <c:orientation val="minMax"/>
+        </c:scaling>
+        <c:delete val="0"/>
+        <c:axPos val="l"/>
+        <c:majorGridlines/>
+        <c:numFmt formatCode="General" sourceLinked="1"/>
+        <c:majorTickMark val="out"/>
+        <c:minorTickMark val="none"/>
+        <c:tickLblPos val="nextTo"/>
+        <c:crossAx val="98362880"/>
+        <c:crosses val="autoZero"/>
+        <c:crossBetween val="midCat"/>
+      </c:valAx>
+    </c:plotArea>
+    <c:plotVisOnly val="1"/>
+    <c:dispBlanksAs val="gap"/>
+    <c:showDLblsOverMax val="0"/>
+  </c:chart>
+  <c:externalData r:id="rId1">
+    <c:autoUpdate val="0"/>
+  </c:externalData>
+</c:chartSpace>
+</file>
+
 <file path=ppt/notesMasters/notesMaster1.xml><?xml version="1.0" encoding="utf-8"?>
 <p:notesMaster xmlns:a="http://schemas.openxmlformats.org/drawingml/2006/main" xmlns:r="http://schemas.openxmlformats.org/officeDocument/2006/relationships" xmlns:p="http://schemas.openxmlformats.org/presentationml/2006/main">
   <p:cSld>
@@ -192,7 +385,7 @@
           <a:p>
             <a:fld id="{BACE9A55-F456-44C2-B275-E0D5BE7B625F}" type="datetimeFigureOut">
               <a:rPr lang="da-DK" smtClean="0"/>
-              <a:t>15-02-2015</a:t>
+              <a:t>17-02-2015</a:t>
             </a:fld>
             <a:endParaRPr lang="da-DK"/>
           </a:p>
@@ -725,7 +918,7 @@
           <a:p>
             <a:fld id="{3086593D-D028-4F63-8F10-841251567264}" type="datetimeFigureOut">
               <a:rPr lang="da-DK" smtClean="0"/>
-              <a:t>15-02-2015</a:t>
+              <a:t>17-02-2015</a:t>
             </a:fld>
             <a:endParaRPr lang="da-DK"/>
           </a:p>
@@ -895,7 +1088,7 @@
           <a:p>
             <a:fld id="{3086593D-D028-4F63-8F10-841251567264}" type="datetimeFigureOut">
               <a:rPr lang="da-DK" smtClean="0"/>
-              <a:t>15-02-2015</a:t>
+              <a:t>17-02-2015</a:t>
             </a:fld>
             <a:endParaRPr lang="da-DK"/>
           </a:p>
@@ -1075,7 +1268,7 @@
           <a:p>
             <a:fld id="{3086593D-D028-4F63-8F10-841251567264}" type="datetimeFigureOut">
               <a:rPr lang="da-DK" smtClean="0"/>
-              <a:t>15-02-2015</a:t>
+              <a:t>17-02-2015</a:t>
             </a:fld>
             <a:endParaRPr lang="da-DK"/>
           </a:p>
@@ -1245,7 +1438,7 @@
           <a:p>
             <a:fld id="{3086593D-D028-4F63-8F10-841251567264}" type="datetimeFigureOut">
               <a:rPr lang="da-DK" smtClean="0"/>
-              <a:t>15-02-2015</a:t>
+              <a:t>17-02-2015</a:t>
             </a:fld>
             <a:endParaRPr lang="da-DK"/>
           </a:p>
@@ -1491,7 +1684,7 @@
           <a:p>
             <a:fld id="{3086593D-D028-4F63-8F10-841251567264}" type="datetimeFigureOut">
               <a:rPr lang="da-DK" smtClean="0"/>
-              <a:t>15-02-2015</a:t>
+              <a:t>17-02-2015</a:t>
             </a:fld>
             <a:endParaRPr lang="da-DK"/>
           </a:p>
@@ -1779,7 +1972,7 @@
           <a:p>
             <a:fld id="{3086593D-D028-4F63-8F10-841251567264}" type="datetimeFigureOut">
               <a:rPr lang="da-DK" smtClean="0"/>
-              <a:t>15-02-2015</a:t>
+              <a:t>17-02-2015</a:t>
             </a:fld>
             <a:endParaRPr lang="da-DK"/>
           </a:p>
@@ -2201,7 +2394,7 @@
           <a:p>
             <a:fld id="{3086593D-D028-4F63-8F10-841251567264}" type="datetimeFigureOut">
               <a:rPr lang="da-DK" smtClean="0"/>
-              <a:t>15-02-2015</a:t>
+              <a:t>17-02-2015</a:t>
             </a:fld>
             <a:endParaRPr lang="da-DK"/>
           </a:p>
@@ -2319,7 +2512,7 @@
           <a:p>
             <a:fld id="{3086593D-D028-4F63-8F10-841251567264}" type="datetimeFigureOut">
               <a:rPr lang="da-DK" smtClean="0"/>
-              <a:t>15-02-2015</a:t>
+              <a:t>17-02-2015</a:t>
             </a:fld>
             <a:endParaRPr lang="da-DK"/>
           </a:p>
@@ -2414,7 +2607,7 @@
           <a:p>
             <a:fld id="{3086593D-D028-4F63-8F10-841251567264}" type="datetimeFigureOut">
               <a:rPr lang="da-DK" smtClean="0"/>
-              <a:t>15-02-2015</a:t>
+              <a:t>17-02-2015</a:t>
             </a:fld>
             <a:endParaRPr lang="da-DK"/>
           </a:p>
@@ -2691,7 +2884,7 @@
           <a:p>
             <a:fld id="{3086593D-D028-4F63-8F10-841251567264}" type="datetimeFigureOut">
               <a:rPr lang="da-DK" smtClean="0"/>
-              <a:t>15-02-2015</a:t>
+              <a:t>17-02-2015</a:t>
             </a:fld>
             <a:endParaRPr lang="da-DK"/>
           </a:p>
@@ -2944,7 +3137,7 @@
           <a:p>
             <a:fld id="{3086593D-D028-4F63-8F10-841251567264}" type="datetimeFigureOut">
               <a:rPr lang="da-DK" smtClean="0"/>
-              <a:t>15-02-2015</a:t>
+              <a:t>17-02-2015</a:t>
             </a:fld>
             <a:endParaRPr lang="da-DK"/>
           </a:p>
@@ -3157,7 +3350,7 @@
           <a:p>
             <a:fld id="{3086593D-D028-4F63-8F10-841251567264}" type="datetimeFigureOut">
               <a:rPr lang="da-DK" smtClean="0"/>
-              <a:t>15-02-2015</a:t>
+              <a:t>17-02-2015</a:t>
             </a:fld>
             <a:endParaRPr lang="da-DK"/>
           </a:p>
@@ -3532,45 +3725,6 @@
           <a:chExt cx="0" cy="0"/>
         </a:xfrm>
       </p:grpSpPr>
-      <p:pic>
-        <p:nvPicPr>
-          <p:cNvPr id="1026" name="Picture 2" descr="Z:\ThomasFiilLyngholm\TISYE\Dokumenter\SEMP\Billeder\Risk.PNG"/>
-          <p:cNvPicPr>
-            <a:picLocks noChangeAspect="1" noChangeArrowheads="1"/>
-          </p:cNvPicPr>
-          <p:nvPr/>
-        </p:nvPicPr>
-        <p:blipFill rotWithShape="1">
-          <a:blip r:embed="rId3">
-            <a:extLst>
-              <a:ext uri="{28A0092B-C50C-407E-A947-70E740481C1C}">
-                <a14:useLocalDpi xmlns:a14="http://schemas.microsoft.com/office/drawing/2010/main" val="0"/>
-              </a:ext>
-            </a:extLst>
-          </a:blip>
-          <a:srcRect l="397" t="446" r="364" b="516"/>
-          <a:stretch/>
-        </p:blipFill>
-        <p:spPr bwMode="auto">
-          <a:xfrm>
-            <a:off x="16669" y="-9525"/>
-            <a:ext cx="9093994" cy="6867525"/>
-          </a:xfrm>
-          <a:prstGeom prst="rect">
-            <a:avLst/>
-          </a:prstGeom>
-          <a:noFill/>
-          <a:extLst>
-            <a:ext uri="{909E8E84-426E-40DD-AFC4-6F175D3DCCD1}">
-              <a14:hiddenFill xmlns:a14="http://schemas.microsoft.com/office/drawing/2010/main">
-                <a:solidFill>
-                  <a:srgbClr val="FFFFFF"/>
-                </a:solidFill>
-              </a14:hiddenFill>
-            </a:ext>
-          </a:extLst>
-        </p:spPr>
-      </p:pic>
       <p:sp>
         <p:nvSpPr>
           <p:cNvPr id="4" name="Kombinationstegning 3"/>
@@ -4069,6 +4223,30 @@
           </a:p>
         </p:txBody>
       </p:sp>
+      <p:graphicFrame>
+        <p:nvGraphicFramePr>
+          <p:cNvPr id="17" name="Diagram 16"/>
+          <p:cNvGraphicFramePr>
+            <a:graphicFrameLocks/>
+          </p:cNvGraphicFramePr>
+          <p:nvPr>
+            <p:extLst>
+              <p:ext uri="{D42A27DB-BD31-4B8C-83A1-F6EECF244321}">
+                <p14:modId xmlns:p14="http://schemas.microsoft.com/office/powerpoint/2010/main" val="2002939299"/>
+              </p:ext>
+            </p:extLst>
+          </p:nvPr>
+        </p:nvGraphicFramePr>
+        <p:xfrm>
+          <a:off x="0" y="-76200"/>
+          <a:ext cx="9237302" cy="6934200"/>
+        </p:xfrm>
+        <a:graphic>
+          <a:graphicData uri="http://schemas.openxmlformats.org/drawingml/2006/chart">
+            <c:chart xmlns:c="http://schemas.openxmlformats.org/drawingml/2006/chart" xmlns:r="http://schemas.openxmlformats.org/officeDocument/2006/relationships" r:id="rId3"/>
+          </a:graphicData>
+        </a:graphic>
+      </p:graphicFrame>
       <p:sp>
         <p:nvSpPr>
           <p:cNvPr id="11" name="Tekstboks 10"/>
@@ -4077,7 +4255,7 @@
         </p:nvSpPr>
         <p:spPr>
           <a:xfrm>
-            <a:off x="7566885" y="3321610"/>
+            <a:off x="5856694" y="3806989"/>
             <a:ext cx="396015" cy="369332"/>
           </a:xfrm>
           <a:prstGeom prst="rect">
@@ -4107,7 +4285,7 @@
         </p:nvSpPr>
         <p:spPr>
           <a:xfrm>
-            <a:off x="4114800" y="1371600"/>
+            <a:off x="3032985" y="2340612"/>
             <a:ext cx="396015" cy="369332"/>
           </a:xfrm>
           <a:prstGeom prst="rect">
@@ -4125,7 +4303,6 @@
               <a:rPr lang="da-DK" dirty="0"/>
               <a:t>2</a:t>
             </a:r>
-            <a:endParaRPr lang="da-DK" dirty="0"/>
           </a:p>
         </p:txBody>
       </p:sp>
@@ -4137,7 +4314,7 @@
         </p:nvSpPr>
         <p:spPr>
           <a:xfrm>
-            <a:off x="5029201" y="2746803"/>
+            <a:off x="3951890" y="3349955"/>
             <a:ext cx="457200" cy="369332"/>
           </a:xfrm>
           <a:prstGeom prst="rect">
@@ -4167,7 +4344,7 @@
         </p:nvSpPr>
         <p:spPr>
           <a:xfrm>
-            <a:off x="3555875" y="1410170"/>
+            <a:off x="3230992" y="2155946"/>
             <a:ext cx="396015" cy="369332"/>
           </a:xfrm>
           <a:prstGeom prst="rect">
@@ -4185,7 +4362,6 @@
               <a:rPr lang="da-DK" dirty="0"/>
               <a:t>4</a:t>
             </a:r>
-            <a:endParaRPr lang="da-DK" dirty="0"/>
           </a:p>
         </p:txBody>
       </p:sp>
@@ -4197,7 +4373,7 @@
         </p:nvSpPr>
         <p:spPr>
           <a:xfrm>
-            <a:off x="3723789" y="2730761"/>
+            <a:off x="2885589" y="3352006"/>
             <a:ext cx="543411" cy="369332"/>
           </a:xfrm>
           <a:prstGeom prst="rect">
@@ -4227,7 +4403,7 @@
         </p:nvSpPr>
         <p:spPr>
           <a:xfrm>
-            <a:off x="2575785" y="918217"/>
+            <a:off x="2057400" y="1786614"/>
             <a:ext cx="396015" cy="369332"/>
           </a:xfrm>
           <a:prstGeom prst="rect">
@@ -4244,6 +4420,70 @@
             <a:r>
               <a:rPr lang="da-DK" dirty="0" smtClean="0"/>
               <a:t> 6</a:t>
+            </a:r>
+            <a:endParaRPr lang="da-DK" dirty="0"/>
+          </a:p>
+        </p:txBody>
+      </p:sp>
+      <p:sp>
+        <p:nvSpPr>
+          <p:cNvPr id="18" name="Tekstboks 17"/>
+          <p:cNvSpPr txBox="1"/>
+          <p:nvPr/>
+        </p:nvSpPr>
+        <p:spPr>
+          <a:xfrm>
+            <a:off x="7764892" y="1335817"/>
+            <a:ext cx="396015" cy="369332"/>
+          </a:xfrm>
+          <a:prstGeom prst="rect">
+            <a:avLst/>
+          </a:prstGeom>
+          <a:noFill/>
+        </p:spPr>
+        <p:txBody>
+          <a:bodyPr wrap="square" rtlCol="0">
+            <a:spAutoFit/>
+          </a:bodyPr>
+          <a:lstStyle/>
+          <a:p>
+            <a:r>
+              <a:rPr lang="da-DK" dirty="0"/>
+              <a:t>8</a:t>
+            </a:r>
+            <a:endParaRPr lang="da-DK" dirty="0"/>
+          </a:p>
+        </p:txBody>
+      </p:sp>
+      <p:sp>
+        <p:nvSpPr>
+          <p:cNvPr id="19" name="Tekstboks 18"/>
+          <p:cNvSpPr txBox="1"/>
+          <p:nvPr/>
+        </p:nvSpPr>
+        <p:spPr>
+          <a:xfrm>
+            <a:off x="1076806" y="1295400"/>
+            <a:ext cx="396015" cy="369332"/>
+          </a:xfrm>
+          <a:prstGeom prst="rect">
+            <a:avLst/>
+          </a:prstGeom>
+          <a:noFill/>
+        </p:spPr>
+        <p:txBody>
+          <a:bodyPr wrap="square" rtlCol="0">
+            <a:spAutoFit/>
+          </a:bodyPr>
+          <a:lstStyle/>
+          <a:p>
+            <a:r>
+              <a:rPr lang="da-DK" dirty="0" smtClean="0"/>
+              <a:t> </a:t>
+            </a:r>
+            <a:r>
+              <a:rPr lang="da-DK" dirty="0" smtClean="0"/>
+              <a:t>7</a:t>
             </a:r>
             <a:endParaRPr lang="da-DK" dirty="0"/>
           </a:p>

</xml_diff>